<commit_message>
add the new ppt
</commit_message>
<xml_diff>
--- a/Notes-App_Presentation.pptx
+++ b/Notes-App_Presentation.pptx
@@ -3170,12 +3170,16 @@
               <a:t>Amresh</a:t>
             </a:r>
             <a:r>
+              <a:rPr lang="en-US" dirty="0"/>
+              <a:t> </a:t>
+            </a:r>
+            <a:r>
               <a:rPr lang="en-US" dirty="0" smtClean="0"/>
-              <a:t> </a:t>
+              <a:t>, </a:t>
             </a:r>
             <a:r>
               <a:rPr lang="en-US" dirty="0" err="1" smtClean="0"/>
-              <a:t>Chaurasiya</a:t>
+              <a:t>Asmit</a:t>
             </a:r>
             <a:endParaRPr dirty="0"/>
           </a:p>
@@ -3257,49 +3261,58 @@
           <a:lstStyle/>
           <a:p>
             <a:r>
+              <a:rPr dirty="0"/>
               <a:t>Objective:</a:t>
             </a:r>
           </a:p>
           <a:p>
             <a:r>
+              <a:rPr dirty="0"/>
               <a:t>- Build a secure and responsive Notes management system</a:t>
             </a:r>
           </a:p>
           <a:p>
             <a:r>
+              <a:rPr dirty="0"/>
               <a:t>- Enable users to store, edit, and delete notes</a:t>
             </a:r>
           </a:p>
           <a:p>
             <a:r>
+              <a:rPr dirty="0"/>
               <a:t>- Ensure user authentication and data privacy</a:t>
             </a:r>
           </a:p>
           <a:p>
-            <a:endParaRPr/>
-          </a:p>
-          <a:p>
-            <a:r>
+            <a:endParaRPr dirty="0"/>
+          </a:p>
+          <a:p>
+            <a:r>
+              <a:rPr dirty="0"/>
               <a:t>Key Features:</a:t>
             </a:r>
           </a:p>
           <a:p>
             <a:r>
+              <a:rPr dirty="0"/>
               <a:t>- User registration &amp; login</a:t>
             </a:r>
           </a:p>
           <a:p>
             <a:r>
+              <a:rPr dirty="0"/>
               <a:t>- CRUD operations on notes</a:t>
             </a:r>
           </a:p>
           <a:p>
             <a:r>
+              <a:rPr dirty="0"/>
               <a:t>- JWT-based authentication</a:t>
             </a:r>
           </a:p>
           <a:p>
             <a:r>
+              <a:rPr dirty="0"/>
               <a:t>- Error handling for better UX</a:t>
             </a:r>
           </a:p>
@@ -3369,49 +3382,70 @@
           <a:lstStyle/>
           <a:p>
             <a:r>
-              <a:t>Frontend: N/A (Backend-focused app, can be integrated with React or other frontends)</a:t>
-            </a:r>
-          </a:p>
-          <a:p>
-            <a:r>
+              <a:rPr dirty="0"/>
+              <a:t>Frontend: </a:t>
+            </a:r>
+            <a:r>
+              <a:rPr lang="en-US" dirty="0" smtClean="0"/>
+              <a:t>HTNL,CSS,JS</a:t>
+            </a:r>
+            <a:r>
+              <a:rPr dirty="0" smtClean="0"/>
+              <a:t> </a:t>
+            </a:r>
+            <a:r>
+              <a:rPr dirty="0"/>
+              <a:t>(Backend-focused app, can be integrated with React or other frontends)</a:t>
+            </a:r>
+          </a:p>
+          <a:p>
+            <a:r>
+              <a:rPr dirty="0"/>
               <a:t>Backend: Node.js + Express</a:t>
             </a:r>
           </a:p>
           <a:p>
             <a:r>
+              <a:rPr dirty="0"/>
               <a:t>Database: MongoDB (using Mongoose)</a:t>
             </a:r>
           </a:p>
           <a:p>
             <a:r>
+              <a:rPr dirty="0"/>
               <a:t>Authentication: JWT</a:t>
             </a:r>
           </a:p>
           <a:p>
-            <a:endParaRPr/>
-          </a:p>
-          <a:p>
-            <a:r>
+            <a:endParaRPr dirty="0"/>
+          </a:p>
+          <a:p>
+            <a:r>
+              <a:rPr dirty="0"/>
               <a:t>Architecture Flow:</a:t>
             </a:r>
           </a:p>
           <a:p>
             <a:r>
+              <a:rPr dirty="0"/>
               <a:t>1. User sends HTTP requests (GET, POST, PUT, DELETE)</a:t>
             </a:r>
           </a:p>
           <a:p>
             <a:r>
+              <a:rPr dirty="0"/>
               <a:t>2. Express routes handle requests</a:t>
             </a:r>
           </a:p>
           <a:p>
             <a:r>
+              <a:rPr dirty="0"/>
               <a:t>3. Controllers process logic &amp; interact with MongoDB</a:t>
             </a:r>
           </a:p>
           <a:p>
             <a:r>
+              <a:rPr dirty="0"/>
               <a:t>4. Responses returned in JSON format</a:t>
             </a:r>
           </a:p>

</xml_diff>